<commit_message>
added impact in pres
</commit_message>
<xml_diff>
--- a/data_visualization/project.pptx
+++ b/data_visualization/project.pptx
@@ -10,6 +10,11 @@
     <p:sldId id="258" r:id="rId4"/>
     <p:sldId id="259" r:id="rId5"/>
     <p:sldId id="260" r:id="rId6"/>
+    <p:sldId id="261" r:id="rId7"/>
+    <p:sldId id="262" r:id="rId8"/>
+    <p:sldId id="263" r:id="rId9"/>
+    <p:sldId id="264" r:id="rId10"/>
+    <p:sldId id="265" r:id="rId11"/>
   </p:sldIdLst>
   <p:sldSz cx="12192000" cy="6858000"/>
   <p:notesSz cx="6858000" cy="9144000"/>
@@ -108,6 +113,11 @@
       </a:defRPr>
     </a:lvl9pPr>
   </p:defaultTextStyle>
+  <p:extLst>
+    <p:ext uri="{EFAFB233-063F-42B5-8137-9DF3F51BA10A}">
+      <p15:sldGuideLst xmlns:p15="http://schemas.microsoft.com/office/powerpoint/2012/main"/>
+    </p:ext>
+  </p:extLst>
 </p:presentation>
 </file>
 
@@ -258,7 +268,7 @@
           <a:p>
             <a:fld id="{296FADEF-E30F-4358-8C1A-AA929F7F0BF4}" type="datetimeFigureOut">
               <a:rPr lang="ru-RU" smtClean="0"/>
-              <a:t>25.05.2024</a:t>
+              <a:t>27.05.2024</a:t>
             </a:fld>
             <a:endParaRPr lang="ru-RU"/>
           </a:p>
@@ -456,7 +466,7 @@
           <a:p>
             <a:fld id="{296FADEF-E30F-4358-8C1A-AA929F7F0BF4}" type="datetimeFigureOut">
               <a:rPr lang="ru-RU" smtClean="0"/>
-              <a:t>25.05.2024</a:t>
+              <a:t>27.05.2024</a:t>
             </a:fld>
             <a:endParaRPr lang="ru-RU"/>
           </a:p>
@@ -664,7 +674,7 @@
           <a:p>
             <a:fld id="{296FADEF-E30F-4358-8C1A-AA929F7F0BF4}" type="datetimeFigureOut">
               <a:rPr lang="ru-RU" smtClean="0"/>
-              <a:t>25.05.2024</a:t>
+              <a:t>27.05.2024</a:t>
             </a:fld>
             <a:endParaRPr lang="ru-RU"/>
           </a:p>
@@ -862,7 +872,7 @@
           <a:p>
             <a:fld id="{296FADEF-E30F-4358-8C1A-AA929F7F0BF4}" type="datetimeFigureOut">
               <a:rPr lang="ru-RU" smtClean="0"/>
-              <a:t>25.05.2024</a:t>
+              <a:t>27.05.2024</a:t>
             </a:fld>
             <a:endParaRPr lang="ru-RU"/>
           </a:p>
@@ -1137,7 +1147,7 @@
           <a:p>
             <a:fld id="{296FADEF-E30F-4358-8C1A-AA929F7F0BF4}" type="datetimeFigureOut">
               <a:rPr lang="ru-RU" smtClean="0"/>
-              <a:t>25.05.2024</a:t>
+              <a:t>27.05.2024</a:t>
             </a:fld>
             <a:endParaRPr lang="ru-RU"/>
           </a:p>
@@ -1402,7 +1412,7 @@
           <a:p>
             <a:fld id="{296FADEF-E30F-4358-8C1A-AA929F7F0BF4}" type="datetimeFigureOut">
               <a:rPr lang="ru-RU" smtClean="0"/>
-              <a:t>25.05.2024</a:t>
+              <a:t>27.05.2024</a:t>
             </a:fld>
             <a:endParaRPr lang="ru-RU"/>
           </a:p>
@@ -1814,7 +1824,7 @@
           <a:p>
             <a:fld id="{296FADEF-E30F-4358-8C1A-AA929F7F0BF4}" type="datetimeFigureOut">
               <a:rPr lang="ru-RU" smtClean="0"/>
-              <a:t>25.05.2024</a:t>
+              <a:t>27.05.2024</a:t>
             </a:fld>
             <a:endParaRPr lang="ru-RU"/>
           </a:p>
@@ -1955,7 +1965,7 @@
           <a:p>
             <a:fld id="{296FADEF-E30F-4358-8C1A-AA929F7F0BF4}" type="datetimeFigureOut">
               <a:rPr lang="ru-RU" smtClean="0"/>
-              <a:t>25.05.2024</a:t>
+              <a:t>27.05.2024</a:t>
             </a:fld>
             <a:endParaRPr lang="ru-RU"/>
           </a:p>
@@ -2068,7 +2078,7 @@
           <a:p>
             <a:fld id="{296FADEF-E30F-4358-8C1A-AA929F7F0BF4}" type="datetimeFigureOut">
               <a:rPr lang="ru-RU" smtClean="0"/>
-              <a:t>25.05.2024</a:t>
+              <a:t>27.05.2024</a:t>
             </a:fld>
             <a:endParaRPr lang="ru-RU"/>
           </a:p>
@@ -2379,7 +2389,7 @@
           <a:p>
             <a:fld id="{296FADEF-E30F-4358-8C1A-AA929F7F0BF4}" type="datetimeFigureOut">
               <a:rPr lang="ru-RU" smtClean="0"/>
-              <a:t>25.05.2024</a:t>
+              <a:t>27.05.2024</a:t>
             </a:fld>
             <a:endParaRPr lang="ru-RU"/>
           </a:p>
@@ -2667,7 +2677,7 @@
           <a:p>
             <a:fld id="{296FADEF-E30F-4358-8C1A-AA929F7F0BF4}" type="datetimeFigureOut">
               <a:rPr lang="ru-RU" smtClean="0"/>
-              <a:t>25.05.2024</a:t>
+              <a:t>27.05.2024</a:t>
             </a:fld>
             <a:endParaRPr lang="ru-RU"/>
           </a:p>
@@ -2908,7 +2918,7 @@
           <a:p>
             <a:fld id="{296FADEF-E30F-4358-8C1A-AA929F7F0BF4}" type="datetimeFigureOut">
               <a:rPr lang="ru-RU" smtClean="0"/>
-              <a:t>25.05.2024</a:t>
+              <a:t>27.05.2024</a:t>
             </a:fld>
             <a:endParaRPr lang="ru-RU"/>
           </a:p>
@@ -3428,6 +3438,71 @@
 </p:sld>
 </file>
 
+<file path=ppt/slides/slide10.xml><?xml version="1.0" encoding="utf-8"?>
+<p:sld xmlns:a="http://schemas.openxmlformats.org/drawingml/2006/main" xmlns:r="http://schemas.openxmlformats.org/officeDocument/2006/relationships" xmlns:p="http://schemas.openxmlformats.org/presentationml/2006/main">
+  <p:cSld>
+    <p:spTree>
+      <p:nvGrpSpPr>
+        <p:cNvPr id="1" name=""/>
+        <p:cNvGrpSpPr/>
+        <p:nvPr/>
+      </p:nvGrpSpPr>
+      <p:grpSpPr>
+        <a:xfrm>
+          <a:off x="0" y="0"/>
+          <a:ext cx="0" cy="0"/>
+          <a:chOff x="0" y="0"/>
+          <a:chExt cx="0" cy="0"/>
+        </a:xfrm>
+      </p:grpSpPr>
+      <p:pic>
+        <p:nvPicPr>
+          <p:cNvPr id="5" name="Объект 4">
+            <a:extLst>
+              <a:ext uri="{FF2B5EF4-FFF2-40B4-BE49-F238E27FC236}">
+                <a16:creationId xmlns:a16="http://schemas.microsoft.com/office/drawing/2014/main" id="{5DB72F83-16FA-4730-919B-B30B4EDD8FC9}"/>
+              </a:ext>
+            </a:extLst>
+          </p:cNvPr>
+          <p:cNvPicPr>
+            <a:picLocks noGrp="1" noChangeAspect="1"/>
+          </p:cNvPicPr>
+          <p:nvPr>
+            <p:ph idx="1"/>
+          </p:nvPr>
+        </p:nvPicPr>
+        <p:blipFill>
+          <a:blip r:embed="rId2">
+            <a:extLst>
+              <a:ext uri="{28A0092B-C50C-407E-A947-70E740481C1C}">
+                <a14:useLocalDpi xmlns:a14="http://schemas.microsoft.com/office/drawing/2010/main" val="0"/>
+              </a:ext>
+            </a:extLst>
+          </a:blip>
+          <a:stretch>
+            <a:fillRect/>
+          </a:stretch>
+        </p:blipFill>
+        <p:spPr>
+          <a:xfrm>
+            <a:off x="2210721" y="320777"/>
+            <a:ext cx="7770557" cy="6216446"/>
+          </a:xfrm>
+        </p:spPr>
+      </p:pic>
+    </p:spTree>
+    <p:extLst>
+      <p:ext uri="{BB962C8B-B14F-4D97-AF65-F5344CB8AC3E}">
+        <p14:creationId xmlns:p14="http://schemas.microsoft.com/office/powerpoint/2010/main" val="1399370895"/>
+      </p:ext>
+    </p:extLst>
+  </p:cSld>
+  <p:clrMapOvr>
+    <a:masterClrMapping/>
+  </p:clrMapOvr>
+</p:sld>
+</file>
+
 <file path=ppt/slides/slide2.xml><?xml version="1.0" encoding="utf-8"?>
 <p:sld xmlns:a="http://schemas.openxmlformats.org/drawingml/2006/main" xmlns:r="http://schemas.openxmlformats.org/officeDocument/2006/relationships" xmlns:p="http://schemas.openxmlformats.org/presentationml/2006/main">
   <p:cSld>
@@ -4015,6 +4090,267 @@
     <p:extLst>
       <p:ext uri="{BB962C8B-B14F-4D97-AF65-F5344CB8AC3E}">
         <p14:creationId xmlns:p14="http://schemas.microsoft.com/office/powerpoint/2010/main" val="1079256599"/>
+      </p:ext>
+    </p:extLst>
+  </p:cSld>
+  <p:clrMapOvr>
+    <a:masterClrMapping/>
+  </p:clrMapOvr>
+</p:sld>
+</file>
+
+<file path=ppt/slides/slide6.xml><?xml version="1.0" encoding="utf-8"?>
+<p:sld xmlns:a="http://schemas.openxmlformats.org/drawingml/2006/main" xmlns:r="http://schemas.openxmlformats.org/officeDocument/2006/relationships" xmlns:p="http://schemas.openxmlformats.org/presentationml/2006/main">
+  <p:cSld>
+    <p:spTree>
+      <p:nvGrpSpPr>
+        <p:cNvPr id="1" name=""/>
+        <p:cNvGrpSpPr/>
+        <p:nvPr/>
+      </p:nvGrpSpPr>
+      <p:grpSpPr>
+        <a:xfrm>
+          <a:off x="0" y="0"/>
+          <a:ext cx="0" cy="0"/>
+          <a:chOff x="0" y="0"/>
+          <a:chExt cx="0" cy="0"/>
+        </a:xfrm>
+      </p:grpSpPr>
+      <p:pic>
+        <p:nvPicPr>
+          <p:cNvPr id="6" name="Рисунок 5">
+            <a:extLst>
+              <a:ext uri="{FF2B5EF4-FFF2-40B4-BE49-F238E27FC236}">
+                <a16:creationId xmlns:a16="http://schemas.microsoft.com/office/drawing/2014/main" id="{73EA9442-130C-4731-A240-0A5451DAFD6C}"/>
+              </a:ext>
+            </a:extLst>
+          </p:cNvPr>
+          <p:cNvPicPr>
+            <a:picLocks noChangeAspect="1"/>
+          </p:cNvPicPr>
+          <p:nvPr/>
+        </p:nvPicPr>
+        <p:blipFill>
+          <a:blip r:embed="rId2">
+            <a:extLst>
+              <a:ext uri="{28A0092B-C50C-407E-A947-70E740481C1C}">
+                <a14:useLocalDpi xmlns:a14="http://schemas.microsoft.com/office/drawing/2010/main" val="0"/>
+              </a:ext>
+            </a:extLst>
+          </a:blip>
+          <a:stretch>
+            <a:fillRect/>
+          </a:stretch>
+        </p:blipFill>
+        <p:spPr>
+          <a:xfrm>
+            <a:off x="957938" y="346163"/>
+            <a:ext cx="10276123" cy="6165674"/>
+          </a:xfrm>
+          <a:prstGeom prst="rect">
+            <a:avLst/>
+          </a:prstGeom>
+        </p:spPr>
+      </p:pic>
+    </p:spTree>
+    <p:extLst>
+      <p:ext uri="{BB962C8B-B14F-4D97-AF65-F5344CB8AC3E}">
+        <p14:creationId xmlns:p14="http://schemas.microsoft.com/office/powerpoint/2010/main" val="2769359517"/>
+      </p:ext>
+    </p:extLst>
+  </p:cSld>
+  <p:clrMapOvr>
+    <a:masterClrMapping/>
+  </p:clrMapOvr>
+</p:sld>
+</file>
+
+<file path=ppt/slides/slide7.xml><?xml version="1.0" encoding="utf-8"?>
+<p:sld xmlns:a="http://schemas.openxmlformats.org/drawingml/2006/main" xmlns:r="http://schemas.openxmlformats.org/officeDocument/2006/relationships" xmlns:p="http://schemas.openxmlformats.org/presentationml/2006/main">
+  <p:cSld>
+    <p:spTree>
+      <p:nvGrpSpPr>
+        <p:cNvPr id="1" name=""/>
+        <p:cNvGrpSpPr/>
+        <p:nvPr/>
+      </p:nvGrpSpPr>
+      <p:grpSpPr>
+        <a:xfrm>
+          <a:off x="0" y="0"/>
+          <a:ext cx="0" cy="0"/>
+          <a:chOff x="0" y="0"/>
+          <a:chExt cx="0" cy="0"/>
+        </a:xfrm>
+      </p:grpSpPr>
+      <p:pic>
+        <p:nvPicPr>
+          <p:cNvPr id="5" name="Объект 4">
+            <a:extLst>
+              <a:ext uri="{FF2B5EF4-FFF2-40B4-BE49-F238E27FC236}">
+                <a16:creationId xmlns:a16="http://schemas.microsoft.com/office/drawing/2014/main" id="{E976406F-0491-4F4A-A311-F683FE61FBD1}"/>
+              </a:ext>
+            </a:extLst>
+          </p:cNvPr>
+          <p:cNvPicPr>
+            <a:picLocks noGrp="1" noChangeAspect="1"/>
+          </p:cNvPicPr>
+          <p:nvPr>
+            <p:ph idx="1"/>
+          </p:nvPr>
+        </p:nvPicPr>
+        <p:blipFill>
+          <a:blip r:embed="rId2">
+            <a:extLst>
+              <a:ext uri="{28A0092B-C50C-407E-A947-70E740481C1C}">
+                <a14:useLocalDpi xmlns:a14="http://schemas.microsoft.com/office/drawing/2010/main" val="0"/>
+              </a:ext>
+            </a:extLst>
+          </a:blip>
+          <a:stretch>
+            <a:fillRect/>
+          </a:stretch>
+        </p:blipFill>
+        <p:spPr>
+          <a:xfrm>
+            <a:off x="1092419" y="426851"/>
+            <a:ext cx="10007162" cy="6004298"/>
+          </a:xfrm>
+        </p:spPr>
+      </p:pic>
+    </p:spTree>
+    <p:extLst>
+      <p:ext uri="{BB962C8B-B14F-4D97-AF65-F5344CB8AC3E}">
+        <p14:creationId xmlns:p14="http://schemas.microsoft.com/office/powerpoint/2010/main" val="4233293365"/>
+      </p:ext>
+    </p:extLst>
+  </p:cSld>
+  <p:clrMapOvr>
+    <a:masterClrMapping/>
+  </p:clrMapOvr>
+</p:sld>
+</file>
+
+<file path=ppt/slides/slide8.xml><?xml version="1.0" encoding="utf-8"?>
+<p:sld xmlns:a="http://schemas.openxmlformats.org/drawingml/2006/main" xmlns:r="http://schemas.openxmlformats.org/officeDocument/2006/relationships" xmlns:p="http://schemas.openxmlformats.org/presentationml/2006/main">
+  <p:cSld>
+    <p:spTree>
+      <p:nvGrpSpPr>
+        <p:cNvPr id="1" name=""/>
+        <p:cNvGrpSpPr/>
+        <p:nvPr/>
+      </p:nvGrpSpPr>
+      <p:grpSpPr>
+        <a:xfrm>
+          <a:off x="0" y="0"/>
+          <a:ext cx="0" cy="0"/>
+          <a:chOff x="0" y="0"/>
+          <a:chExt cx="0" cy="0"/>
+        </a:xfrm>
+      </p:grpSpPr>
+      <p:pic>
+        <p:nvPicPr>
+          <p:cNvPr id="5" name="Объект 4">
+            <a:extLst>
+              <a:ext uri="{FF2B5EF4-FFF2-40B4-BE49-F238E27FC236}">
+                <a16:creationId xmlns:a16="http://schemas.microsoft.com/office/drawing/2014/main" id="{EDECE34C-CC6B-4C1B-8A28-1E9020271E8F}"/>
+              </a:ext>
+            </a:extLst>
+          </p:cNvPr>
+          <p:cNvPicPr>
+            <a:picLocks noGrp="1" noChangeAspect="1"/>
+          </p:cNvPicPr>
+          <p:nvPr>
+            <p:ph idx="1"/>
+          </p:nvPr>
+        </p:nvPicPr>
+        <p:blipFill>
+          <a:blip r:embed="rId2">
+            <a:extLst>
+              <a:ext uri="{28A0092B-C50C-407E-A947-70E740481C1C}">
+                <a14:useLocalDpi xmlns:a14="http://schemas.microsoft.com/office/drawing/2010/main" val="0"/>
+              </a:ext>
+            </a:extLst>
+          </a:blip>
+          <a:stretch>
+            <a:fillRect/>
+          </a:stretch>
+        </p:blipFill>
+        <p:spPr>
+          <a:xfrm>
+            <a:off x="1086234" y="423140"/>
+            <a:ext cx="10019532" cy="6011720"/>
+          </a:xfrm>
+        </p:spPr>
+      </p:pic>
+    </p:spTree>
+    <p:extLst>
+      <p:ext uri="{BB962C8B-B14F-4D97-AF65-F5344CB8AC3E}">
+        <p14:creationId xmlns:p14="http://schemas.microsoft.com/office/powerpoint/2010/main" val="3924296868"/>
+      </p:ext>
+    </p:extLst>
+  </p:cSld>
+  <p:clrMapOvr>
+    <a:masterClrMapping/>
+  </p:clrMapOvr>
+</p:sld>
+</file>
+
+<file path=ppt/slides/slide9.xml><?xml version="1.0" encoding="utf-8"?>
+<p:sld xmlns:a="http://schemas.openxmlformats.org/drawingml/2006/main" xmlns:r="http://schemas.openxmlformats.org/officeDocument/2006/relationships" xmlns:p="http://schemas.openxmlformats.org/presentationml/2006/main">
+  <p:cSld>
+    <p:spTree>
+      <p:nvGrpSpPr>
+        <p:cNvPr id="1" name=""/>
+        <p:cNvGrpSpPr/>
+        <p:nvPr/>
+      </p:nvGrpSpPr>
+      <p:grpSpPr>
+        <a:xfrm>
+          <a:off x="0" y="0"/>
+          <a:ext cx="0" cy="0"/>
+          <a:chOff x="0" y="0"/>
+          <a:chExt cx="0" cy="0"/>
+        </a:xfrm>
+      </p:grpSpPr>
+      <p:pic>
+        <p:nvPicPr>
+          <p:cNvPr id="5" name="Объект 4">
+            <a:extLst>
+              <a:ext uri="{FF2B5EF4-FFF2-40B4-BE49-F238E27FC236}">
+                <a16:creationId xmlns:a16="http://schemas.microsoft.com/office/drawing/2014/main" id="{1CE6E346-F560-4B02-B529-B7894102DFA0}"/>
+              </a:ext>
+            </a:extLst>
+          </p:cNvPr>
+          <p:cNvPicPr>
+            <a:picLocks noGrp="1" noChangeAspect="1"/>
+          </p:cNvPicPr>
+          <p:nvPr>
+            <p:ph idx="1"/>
+          </p:nvPr>
+        </p:nvPicPr>
+        <p:blipFill>
+          <a:blip r:embed="rId2">
+            <a:extLst>
+              <a:ext uri="{28A0092B-C50C-407E-A947-70E740481C1C}">
+                <a14:useLocalDpi xmlns:a14="http://schemas.microsoft.com/office/drawing/2010/main" val="0"/>
+              </a:ext>
+            </a:extLst>
+          </a:blip>
+          <a:stretch>
+            <a:fillRect/>
+          </a:stretch>
+        </p:blipFill>
+        <p:spPr>
+          <a:xfrm>
+            <a:off x="1135144" y="452486"/>
+            <a:ext cx="9921712" cy="5953028"/>
+          </a:xfrm>
+        </p:spPr>
+      </p:pic>
+    </p:spTree>
+    <p:extLst>
+      <p:ext uri="{BB962C8B-B14F-4D97-AF65-F5344CB8AC3E}">
+        <p14:creationId xmlns:p14="http://schemas.microsoft.com/office/powerpoint/2010/main" val="2479560250"/>
       </p:ext>
     </p:extLst>
   </p:cSld>

</xml_diff>